<commit_message>
Create a pydev project
</commit_message>
<xml_diff>
--- a/doc/09.20.2013 Poster/Wine&Research_poster-Wencan,Diane&Joel_v2.pptx
+++ b/doc/09.20.2013 Poster/Wine&Research_poster-Wencan,Diane&Joel_v2.pptx
@@ -192,7 +192,7 @@
           <a:p>
             <a:fld id="{D5498F95-8F3F-4CF4-9BA1-14E7A917112F}" type="datetimeFigureOut">
               <a:rPr lang="en-US" smtClean="0"/>
-              <a:t>9/21/2013</a:t>
+              <a:t>9/22/2013</a:t>
             </a:fld>
             <a:endParaRPr lang="en-US"/>
           </a:p>
@@ -726,7 +726,7 @@
             <a:fld id="{1D8BD707-D9CF-40AE-B4C6-C98DA3205C09}" type="datetimeFigureOut">
               <a:rPr lang="en-US" smtClean="0"/>
               <a:pPr/>
-              <a:t>9/21/2013</a:t>
+              <a:t>9/22/2013</a:t>
             </a:fld>
             <a:endParaRPr lang="en-US"/>
           </a:p>
@@ -898,7 +898,7 @@
             <a:fld id="{1D8BD707-D9CF-40AE-B4C6-C98DA3205C09}" type="datetimeFigureOut">
               <a:rPr lang="en-US" smtClean="0"/>
               <a:pPr/>
-              <a:t>9/21/2013</a:t>
+              <a:t>9/22/2013</a:t>
             </a:fld>
             <a:endParaRPr lang="en-US"/>
           </a:p>
@@ -1080,7 +1080,7 @@
             <a:fld id="{1D8BD707-D9CF-40AE-B4C6-C98DA3205C09}" type="datetimeFigureOut">
               <a:rPr lang="en-US" smtClean="0"/>
               <a:pPr/>
-              <a:t>9/21/2013</a:t>
+              <a:t>9/22/2013</a:t>
             </a:fld>
             <a:endParaRPr lang="en-US"/>
           </a:p>
@@ -1252,7 +1252,7 @@
             <a:fld id="{1D8BD707-D9CF-40AE-B4C6-C98DA3205C09}" type="datetimeFigureOut">
               <a:rPr lang="en-US" smtClean="0"/>
               <a:pPr/>
-              <a:t>9/21/2013</a:t>
+              <a:t>9/22/2013</a:t>
             </a:fld>
             <a:endParaRPr lang="en-US"/>
           </a:p>
@@ -1500,7 +1500,7 @@
             <a:fld id="{1D8BD707-D9CF-40AE-B4C6-C98DA3205C09}" type="datetimeFigureOut">
               <a:rPr lang="en-US" smtClean="0"/>
               <a:pPr/>
-              <a:t>9/21/2013</a:t>
+              <a:t>9/22/2013</a:t>
             </a:fld>
             <a:endParaRPr lang="en-US"/>
           </a:p>
@@ -1790,7 +1790,7 @@
             <a:fld id="{1D8BD707-D9CF-40AE-B4C6-C98DA3205C09}" type="datetimeFigureOut">
               <a:rPr lang="en-US" smtClean="0"/>
               <a:pPr/>
-              <a:t>9/21/2013</a:t>
+              <a:t>9/22/2013</a:t>
             </a:fld>
             <a:endParaRPr lang="en-US"/>
           </a:p>
@@ -2214,7 +2214,7 @@
             <a:fld id="{1D8BD707-D9CF-40AE-B4C6-C98DA3205C09}" type="datetimeFigureOut">
               <a:rPr lang="en-US" smtClean="0"/>
               <a:pPr/>
-              <a:t>9/21/2013</a:t>
+              <a:t>9/22/2013</a:t>
             </a:fld>
             <a:endParaRPr lang="en-US"/>
           </a:p>
@@ -2334,7 +2334,7 @@
             <a:fld id="{1D8BD707-D9CF-40AE-B4C6-C98DA3205C09}" type="datetimeFigureOut">
               <a:rPr lang="en-US" smtClean="0"/>
               <a:pPr/>
-              <a:t>9/21/2013</a:t>
+              <a:t>9/22/2013</a:t>
             </a:fld>
             <a:endParaRPr lang="en-US"/>
           </a:p>
@@ -2431,7 +2431,7 @@
             <a:fld id="{1D8BD707-D9CF-40AE-B4C6-C98DA3205C09}" type="datetimeFigureOut">
               <a:rPr lang="en-US" smtClean="0"/>
               <a:pPr/>
-              <a:t>9/21/2013</a:t>
+              <a:t>9/22/2013</a:t>
             </a:fld>
             <a:endParaRPr lang="en-US"/>
           </a:p>
@@ -2710,7 +2710,7 @@
             <a:fld id="{1D8BD707-D9CF-40AE-B4C6-C98DA3205C09}" type="datetimeFigureOut">
               <a:rPr lang="en-US" smtClean="0"/>
               <a:pPr/>
-              <a:t>9/21/2013</a:t>
+              <a:t>9/22/2013</a:t>
             </a:fld>
             <a:endParaRPr lang="en-US"/>
           </a:p>
@@ -2965,7 +2965,7 @@
             <a:fld id="{1D8BD707-D9CF-40AE-B4C6-C98DA3205C09}" type="datetimeFigureOut">
               <a:rPr lang="en-US" smtClean="0"/>
               <a:pPr/>
-              <a:t>9/21/2013</a:t>
+              <a:t>9/22/2013</a:t>
             </a:fld>
             <a:endParaRPr lang="en-US"/>
           </a:p>
@@ -3180,7 +3180,7 @@
             <a:fld id="{1D8BD707-D9CF-40AE-B4C6-C98DA3205C09}" type="datetimeFigureOut">
               <a:rPr lang="en-US" smtClean="0"/>
               <a:pPr/>
-              <a:t>9/21/2013</a:t>
+              <a:t>9/22/2013</a:t>
             </a:fld>
             <a:endParaRPr lang="en-US"/>
           </a:p>
@@ -4027,7 +4027,7 @@
           <a:graphicData uri="http://schemas.openxmlformats.org/presentationml/2006/ole">
             <mc:AlternateContent xmlns:mc="http://schemas.openxmlformats.org/markup-compatibility/2006">
               <mc:Choice xmlns:v="urn:schemas-microsoft-com:vml" Requires="v">
-                <p:oleObj spid="_x0000_s1301" name="Equation" r:id="rId5" imgW="428207" imgH="666100" progId="Equation.DSMT4">
+                <p:oleObj spid="_x0000_s1303" name="Equation" r:id="rId5" imgW="428207" imgH="666100" progId="Equation.DSMT4">
                   <p:embed/>
                 </p:oleObj>
               </mc:Choice>
@@ -6331,7 +6331,7 @@
           </p:nvSpPr>
           <p:spPr bwMode="auto">
             <a:xfrm>
-              <a:off x="1769102" y="16119475"/>
+              <a:off x="1894071" y="16119475"/>
               <a:ext cx="3874572" cy="707886"/>
             </a:xfrm>
             <a:prstGeom prst="rect">
@@ -6688,7 +6688,7 @@
           </p:nvSpPr>
           <p:spPr bwMode="auto">
             <a:xfrm>
-              <a:off x="1769101" y="16119475"/>
+              <a:off x="1882443" y="16119475"/>
               <a:ext cx="5486401" cy="707886"/>
             </a:xfrm>
             <a:prstGeom prst="rect">
@@ -6929,8 +6929,8 @@
           </p:txBody>
         </p:sp>
       </p:grpSp>
-      <mc:AlternateContent xmlns:mc="http://schemas.openxmlformats.org/markup-compatibility/2006">
-        <mc:Choice xmlns:a14="http://schemas.microsoft.com/office/drawing/2010/main" Requires="a14">
+      <mc:AlternateContent xmlns:mc="http://schemas.openxmlformats.org/markup-compatibility/2006" xmlns:a14="http://schemas.microsoft.com/office/drawing/2010/main">
+        <mc:Choice Requires="a14">
           <p:graphicFrame>
             <p:nvGraphicFramePr>
               <p:cNvPr id="60" name="Table 59"/>
@@ -7258,7 +7258,7 @@
             </a:graphic>
           </p:graphicFrame>
         </mc:Choice>
-        <mc:Fallback>
+        <mc:Fallback xmlns="">
           <p:graphicFrame>
             <p:nvGraphicFramePr>
               <p:cNvPr id="60" name="Table 59"/>
@@ -7543,7 +7543,7 @@
           </p:nvSpPr>
           <p:spPr bwMode="auto">
             <a:xfrm>
-              <a:off x="1769102" y="16119475"/>
+              <a:off x="1823992" y="16119475"/>
               <a:ext cx="6042088" cy="707886"/>
             </a:xfrm>
             <a:prstGeom prst="rect">
@@ -9505,8 +9505,8 @@
           </mc:Fallback>
         </mc:AlternateContent>
       </p:grpSp>
-      <mc:AlternateContent xmlns:mc="http://schemas.openxmlformats.org/markup-compatibility/2006">
-        <mc:Choice xmlns:a14="http://schemas.microsoft.com/office/drawing/2010/main" Requires="a14">
+      <mc:AlternateContent xmlns:mc="http://schemas.openxmlformats.org/markup-compatibility/2006" xmlns:a14="http://schemas.microsoft.com/office/drawing/2010/main">
+        <mc:Choice Requires="a14">
           <p:sp>
             <p:nvSpPr>
               <p:cNvPr id="90" name="Rectangle 89"/>
@@ -9592,7 +9592,7 @@
             </p:txBody>
           </p:sp>
         </mc:Choice>
-        <mc:Fallback>
+        <mc:Fallback xmlns="">
           <p:sp>
             <p:nvSpPr>
               <p:cNvPr id="90" name="Rectangle 89"/>
@@ -10493,8 +10493,8 @@
           </mc:Fallback>
         </mc:AlternateContent>
       </p:grpSp>
-      <mc:AlternateContent xmlns:mc="http://schemas.openxmlformats.org/markup-compatibility/2006">
-        <mc:Choice xmlns:a14="http://schemas.microsoft.com/office/drawing/2010/main" Requires="a14">
+      <mc:AlternateContent xmlns:mc="http://schemas.openxmlformats.org/markup-compatibility/2006" xmlns:a14="http://schemas.microsoft.com/office/drawing/2010/main">
+        <mc:Choice Requires="a14">
           <p:graphicFrame>
             <p:nvGraphicFramePr>
               <p:cNvPr id="102" name="Table 101"/>
@@ -10836,7 +10836,7 @@
             </a:graphic>
           </p:graphicFrame>
         </mc:Choice>
-        <mc:Fallback>
+        <mc:Fallback xmlns="">
           <p:graphicFrame>
             <p:nvGraphicFramePr>
               <p:cNvPr id="102" name="Table 101"/>
@@ -11448,7 +11448,7 @@
           </p:nvSpPr>
           <p:spPr bwMode="auto">
             <a:xfrm>
-              <a:off x="1769102" y="16119475"/>
+              <a:off x="1899214" y="16119475"/>
               <a:ext cx="6042088" cy="707886"/>
             </a:xfrm>
             <a:prstGeom prst="rect">
@@ -11741,8 +11741,8 @@
           </p:txBody>
         </p:sp>
       </p:grpSp>
-      <mc:AlternateContent xmlns:mc="http://schemas.openxmlformats.org/markup-compatibility/2006">
-        <mc:Choice xmlns:a14="http://schemas.microsoft.com/office/drawing/2010/main" Requires="a14">
+      <mc:AlternateContent xmlns:mc="http://schemas.openxmlformats.org/markup-compatibility/2006" xmlns:a14="http://schemas.microsoft.com/office/drawing/2010/main">
+        <mc:Choice Requires="a14">
           <p:sp>
             <p:nvSpPr>
               <p:cNvPr id="93" name="Rectangle 92"/>
@@ -11828,7 +11828,7 @@
             </p:txBody>
           </p:sp>
         </mc:Choice>
-        <mc:Fallback>
+        <mc:Fallback xmlns="">
           <p:sp>
             <p:nvSpPr>
               <p:cNvPr id="93" name="Rectangle 92"/>
@@ -11867,8 +11867,8 @@
           </p:sp>
         </mc:Fallback>
       </mc:AlternateContent>
-      <mc:AlternateContent xmlns:mc="http://schemas.openxmlformats.org/markup-compatibility/2006">
-        <mc:Choice xmlns:a14="http://schemas.microsoft.com/office/drawing/2010/main" Requires="a14">
+      <mc:AlternateContent xmlns:mc="http://schemas.openxmlformats.org/markup-compatibility/2006" xmlns:a14="http://schemas.microsoft.com/office/drawing/2010/main">
+        <mc:Choice Requires="a14">
           <p:sp>
             <p:nvSpPr>
               <p:cNvPr id="95" name="Rectangle 94"/>
@@ -11954,7 +11954,7 @@
             </p:txBody>
           </p:sp>
         </mc:Choice>
-        <mc:Fallback>
+        <mc:Fallback xmlns="">
           <p:sp>
             <p:nvSpPr>
               <p:cNvPr id="95" name="Rectangle 94"/>

</xml_diff>